<commit_message>
Interactive graphs for markdown, presso changes
</commit_message>
<xml_diff>
--- a/NZIC 20241007.pptx
+++ b/NZIC 20241007.pptx
@@ -5627,7 +5627,7 @@
           <a:p>
             <a:r>
               <a:rPr lang="en-US" sz="4000" dirty="0"/>
-              <a:t>Results - LM1</a:t>
+              <a:t>Model Results - LM1</a:t>
             </a:r>
           </a:p>
         </p:txBody>
@@ -6032,7 +6032,7 @@
         </p:blipFill>
         <p:spPr>
           <a:xfrm>
-            <a:off x="3010346" y="1255124"/>
+            <a:off x="3010346" y="1388127"/>
             <a:ext cx="6800589" cy="5475453"/>
           </a:xfrm>
           <a:prstGeom prst="rect">
@@ -6155,7 +6155,7 @@
                   <a:srgbClr val="000000"/>
                 </a:solidFill>
               </a:rPr>
-              <a:t>Growth rate assumptions for macroeconomic indicators have to be factored.</a:t>
+              <a:t>Growth rate assumptions for macroeconomic indicators post June 2028 should be factored.</a:t>
             </a:r>
           </a:p>
           <a:p>
@@ -6181,7 +6181,7 @@
                   <a:srgbClr val="000000"/>
                 </a:solidFill>
               </a:rPr>
-              <a:t>Proposed architecture is easy to scale and medallion architecture is industry standard.</a:t>
+              <a:t>Proposed architecture is easy to scale, and medallion architecture is industry standard.</a:t>
             </a:r>
           </a:p>
           <a:p>
@@ -6200,7 +6200,7 @@
                   <a:srgbClr val="000000"/>
                 </a:solidFill>
               </a:rPr>
-              <a:t>Mlflow</a:t>
+              <a:t>MLFlow</a:t>
             </a:r>
             <a:r>
               <a:rPr lang="en-US" sz="2000" dirty="0">
@@ -6208,7 +6208,7 @@
                   <a:srgbClr val="000000"/>
                 </a:solidFill>
               </a:rPr>
-              <a:t> Registry, Tracking Server, Feature Store, Azure DevOps, Purview will enhance the workflow by enabling efficient model management, streamlined deployment processes, and improved data governance, ensuring that data and models are accessible, reproducible, and compliant with industry standards."</a:t>
+              <a:t> Registry, Tracking Server, Feature Store, Azure DevOps, Purview will enhance the workflow by enabling efficient model management, streamlined deployment processes, and improved data governance, ensuring that data and models are accessible, reproducible, and compliant with industry standards.</a:t>
             </a:r>
           </a:p>
           <a:p>

</xml_diff>